<commit_message>
Added link to pp
</commit_message>
<xml_diff>
--- a/proj2/docs/checkpoint.pptx
+++ b/proj2/docs/checkpoint.pptx
@@ -360,7 +360,7 @@
           <a:p>
             <a:fld id="{A22E88E1-E8DF-46B1-887B-DC41C5AA562A}" type="slidenum">
               <a:rPr lang="pt-PT" smtClean="0"/>
-              <a:t>‹nº›</a:t>
+              <a:t>‹#›</a:t>
             </a:fld>
             <a:endParaRPr lang="pt-PT"/>
           </a:p>
@@ -742,7 +742,7 @@
           <a:p>
             <a:fld id="{6D22F896-40B5-4ADD-8801-0D06FADFA095}" type="slidenum">
               <a:rPr lang="en-US" smtClean="0"/>
-              <a:t>‹nº›</a:t>
+              <a:t>‹#›</a:t>
             </a:fld>
             <a:endParaRPr lang="en-US" dirty="0"/>
           </a:p>
@@ -955,7 +955,7 @@
           <a:p>
             <a:fld id="{6D22F896-40B5-4ADD-8801-0D06FADFA095}" type="slidenum">
               <a:rPr lang="en-US" smtClean="0"/>
-              <a:t>‹nº›</a:t>
+              <a:t>‹#›</a:t>
             </a:fld>
             <a:endParaRPr lang="en-US" dirty="0"/>
           </a:p>
@@ -1216,7 +1216,7 @@
           <a:p>
             <a:fld id="{6D22F896-40B5-4ADD-8801-0D06FADFA095}" type="slidenum">
               <a:rPr lang="en-US" smtClean="0"/>
-              <a:t>‹nº›</a:t>
+              <a:t>‹#›</a:t>
             </a:fld>
             <a:endParaRPr lang="en-US" dirty="0"/>
           </a:p>
@@ -1391,7 +1391,7 @@
           <a:p>
             <a:fld id="{6D22F896-40B5-4ADD-8801-0D06FADFA095}" type="slidenum">
               <a:rPr lang="en-US" smtClean="0"/>
-              <a:t>‹nº›</a:t>
+              <a:t>‹#›</a:t>
             </a:fld>
             <a:endParaRPr lang="en-US" dirty="0"/>
           </a:p>
@@ -1739,7 +1739,7 @@
           <a:p>
             <a:fld id="{6D22F896-40B5-4ADD-8801-0D06FADFA095}" type="slidenum">
               <a:rPr lang="en-US" smtClean="0"/>
-              <a:t>‹nº›</a:t>
+              <a:t>‹#›</a:t>
             </a:fld>
             <a:endParaRPr lang="en-US" dirty="0"/>
           </a:p>
@@ -2019,7 +2019,7 @@
           <a:p>
             <a:fld id="{6D22F896-40B5-4ADD-8801-0D06FADFA095}" type="slidenum">
               <a:rPr lang="en-US" smtClean="0"/>
-              <a:t>‹nº›</a:t>
+              <a:t>‹#›</a:t>
             </a:fld>
             <a:endParaRPr lang="en-US" dirty="0"/>
           </a:p>
@@ -2403,7 +2403,7 @@
           <a:p>
             <a:fld id="{6D22F896-40B5-4ADD-8801-0D06FADFA095}" type="slidenum">
               <a:rPr lang="en-US" smtClean="0"/>
-              <a:t>‹nº›</a:t>
+              <a:t>‹#›</a:t>
             </a:fld>
             <a:endParaRPr lang="en-US" dirty="0"/>
           </a:p>
@@ -2526,7 +2526,7 @@
           <a:p>
             <a:fld id="{6D22F896-40B5-4ADD-8801-0D06FADFA095}" type="slidenum">
               <a:rPr lang="en-US" smtClean="0"/>
-              <a:t>‹nº›</a:t>
+              <a:t>‹#›</a:t>
             </a:fld>
             <a:endParaRPr lang="en-US" dirty="0"/>
           </a:p>
@@ -2710,7 +2710,7 @@
           <a:p>
             <a:fld id="{6D22F896-40B5-4ADD-8801-0D06FADFA095}" type="slidenum">
               <a:rPr lang="en-US" smtClean="0"/>
-              <a:t>‹nº›</a:t>
+              <a:t>‹#›</a:t>
             </a:fld>
             <a:endParaRPr lang="en-US" dirty="0"/>
           </a:p>
@@ -3082,7 +3082,7 @@
           <a:p>
             <a:fld id="{6D22F896-40B5-4ADD-8801-0D06FADFA095}" type="slidenum">
               <a:rPr lang="en-US" smtClean="0"/>
-              <a:t>‹nº›</a:t>
+              <a:t>‹#›</a:t>
             </a:fld>
             <a:endParaRPr lang="en-US" dirty="0"/>
           </a:p>
@@ -3443,7 +3443,7 @@
           <a:p>
             <a:fld id="{6D22F896-40B5-4ADD-8801-0D06FADFA095}" type="slidenum">
               <a:rPr lang="en-US" smtClean="0"/>
-              <a:t>‹nº›</a:t>
+              <a:t>‹#›</a:t>
             </a:fld>
             <a:endParaRPr lang="en-US" dirty="0"/>
           </a:p>
@@ -3768,7 +3768,7 @@
             <a:fld id="{6D22F896-40B5-4ADD-8801-0D06FADFA095}" type="slidenum">
               <a:rPr lang="en-US" smtClean="0"/>
               <a:pPr/>
-              <a:t>‹nº›</a:t>
+              <a:t>‹#›</a:t>
             </a:fld>
             <a:endParaRPr lang="en-US" dirty="0"/>
           </a:p>
@@ -5172,7 +5172,7 @@
                   </a:schemeClr>
                 </a:solidFill>
               </a:rPr>
-              <a:t>, </a:t>
+              <a:t>, com </a:t>
             </a:r>
             <a:r>
               <a:rPr lang="en-US" sz="1600" dirty="0" err="1">
@@ -5183,7 +5183,7 @@
                   </a:schemeClr>
                 </a:solidFill>
               </a:rPr>
-              <a:t>comvalores</a:t>
+              <a:t>valores</a:t>
             </a:r>
             <a:r>
               <a:rPr lang="en-US" sz="1600" dirty="0">
@@ -5535,7 +5535,29 @@
                   </a:schemeClr>
                 </a:solidFill>
               </a:rPr>
-              <a:t> annual do </a:t>
+              <a:t> </a:t>
+            </a:r>
+            <a:r>
+              <a:rPr lang="en-US" sz="1600" dirty="0" err="1">
+                <a:solidFill>
+                  <a:schemeClr val="tx1">
+                    <a:lumMod val="75000"/>
+                    <a:lumOff val="25000"/>
+                  </a:schemeClr>
+                </a:solidFill>
+              </a:rPr>
+              <a:t>anual</a:t>
+            </a:r>
+            <a:r>
+              <a:rPr lang="en-US" sz="1600" dirty="0">
+                <a:solidFill>
+                  <a:schemeClr val="tx1">
+                    <a:lumMod val="75000"/>
+                    <a:lumOff val="25000"/>
+                  </a:schemeClr>
+                </a:solidFill>
+              </a:rPr>
+              <a:t> do </a:t>
             </a:r>
             <a:r>
               <a:rPr lang="en-US" sz="1600" dirty="0" err="1">
@@ -6107,7 +6129,7 @@
           <a:p>
             <a:pPr lvl="1" algn="just">
               <a:lnSpc>
-                <a:spcPct val="100000"/>
+                <a:spcPct val="200000"/>
               </a:lnSpc>
               <a:buClrTx/>
               <a:buFont typeface="Wingdings" panose="05000000000000000000" pitchFamily="2" charset="2"/>
@@ -6124,7 +6146,7 @@
           <a:p>
             <a:pPr lvl="1" algn="just">
               <a:lnSpc>
-                <a:spcPct val="100000"/>
+                <a:spcPct val="200000"/>
               </a:lnSpc>
               <a:buClrTx/>
               <a:buFont typeface="Wingdings" panose="05000000000000000000" pitchFamily="2" charset="2"/>
@@ -6141,7 +6163,7 @@
           <a:p>
             <a:pPr lvl="1" algn="just">
               <a:lnSpc>
-                <a:spcPct val="100000"/>
+                <a:spcPct val="200000"/>
               </a:lnSpc>
               <a:buClrTx/>
               <a:buFont typeface="Wingdings" panose="05000000000000000000" pitchFamily="2" charset="2"/>
@@ -6158,7 +6180,7 @@
           <a:p>
             <a:pPr lvl="1" algn="just">
               <a:lnSpc>
-                <a:spcPct val="100000"/>
+                <a:spcPct val="200000"/>
               </a:lnSpc>
               <a:buClrTx/>
               <a:buFont typeface="Wingdings" panose="05000000000000000000" pitchFamily="2" charset="2"/>
@@ -6204,6 +6226,139 @@
               <a:rPr lang="en-US" sz="1600" dirty="0" err="1"/>
               <a:t>teórico-práticas</a:t>
             </a:r>
+            <a:endParaRPr lang="en-US" sz="1600" dirty="0"/>
+          </a:p>
+          <a:p>
+            <a:pPr lvl="1">
+              <a:lnSpc>
+                <a:spcPct val="200000"/>
+              </a:lnSpc>
+              <a:buClrTx/>
+              <a:buFont typeface="Wingdings" panose="05000000000000000000" pitchFamily="2" charset="2"/>
+              <a:buChar char="Ø"/>
+            </a:pPr>
+            <a:r>
+              <a:rPr lang="en-US" sz="1600" dirty="0">
+                <a:hlinkClick r:id="rId5"/>
+              </a:rPr>
+              <a:t>https://pandas.pydata.org/</a:t>
+            </a:r>
+            <a:r>
+              <a:rPr lang="en-US" sz="1600" dirty="0"/>
+              <a:t>, </a:t>
+            </a:r>
+            <a:r>
+              <a:rPr lang="en-US" sz="1600" dirty="0">
+                <a:hlinkClick r:id="rId6"/>
+              </a:rPr>
+              <a:t>https://scikit-learn.org/stable/</a:t>
+            </a:r>
+            <a:r>
+              <a:rPr lang="en-US" sz="1600" dirty="0"/>
+              <a:t>, </a:t>
+            </a:r>
+            <a:r>
+              <a:rPr lang="en-US" sz="1600" dirty="0">
+                <a:hlinkClick r:id="rId7"/>
+              </a:rPr>
+              <a:t>https://numpy.org/</a:t>
+            </a:r>
+            <a:r>
+              <a:rPr lang="en-US" sz="1600" dirty="0"/>
+              <a:t>, </a:t>
+            </a:r>
+            <a:r>
+              <a:rPr lang="en-US" sz="1600" dirty="0">
+                <a:hlinkClick r:id="rId8"/>
+              </a:rPr>
+              <a:t>https://matplotlib.org/</a:t>
+            </a:r>
+            <a:r>
+              <a:rPr lang="en-US" sz="1600" dirty="0"/>
+              <a:t>, </a:t>
+            </a:r>
+            <a:r>
+              <a:rPr lang="en-US" sz="1600" dirty="0">
+                <a:hlinkClick r:id="rId9"/>
+              </a:rPr>
+              <a:t>https://keras.io/</a:t>
+            </a:r>
+            <a:endParaRPr lang="en-US" sz="1600" dirty="0"/>
+          </a:p>
+          <a:p>
+            <a:pPr lvl="1" algn="just">
+              <a:lnSpc>
+                <a:spcPct val="170000"/>
+              </a:lnSpc>
+              <a:buClrTx/>
+              <a:buFont typeface="Wingdings" panose="05000000000000000000" pitchFamily="2" charset="2"/>
+              <a:buChar char="Ø"/>
+            </a:pPr>
+            <a:endParaRPr lang="en-US" sz="1600" dirty="0"/>
+          </a:p>
+          <a:p>
+            <a:pPr lvl="1" algn="just">
+              <a:lnSpc>
+                <a:spcPct val="170000"/>
+              </a:lnSpc>
+              <a:buClrTx/>
+              <a:buFont typeface="Wingdings" panose="05000000000000000000" pitchFamily="2" charset="2"/>
+              <a:buChar char="Ø"/>
+            </a:pPr>
+            <a:endParaRPr lang="en-US" sz="1600" dirty="0"/>
+          </a:p>
+          <a:p>
+            <a:pPr lvl="1" algn="just">
+              <a:lnSpc>
+                <a:spcPct val="170000"/>
+              </a:lnSpc>
+              <a:buClrTx/>
+              <a:buFont typeface="Wingdings" panose="05000000000000000000" pitchFamily="2" charset="2"/>
+              <a:buChar char="Ø"/>
+            </a:pPr>
+            <a:endParaRPr lang="en-US" sz="1600" dirty="0"/>
+          </a:p>
+          <a:p>
+            <a:pPr lvl="1" algn="just">
+              <a:lnSpc>
+                <a:spcPct val="170000"/>
+              </a:lnSpc>
+              <a:buClrTx/>
+              <a:buFont typeface="Wingdings" panose="05000000000000000000" pitchFamily="2" charset="2"/>
+              <a:buChar char="Ø"/>
+            </a:pPr>
+            <a:endParaRPr lang="en-US" sz="1600" dirty="0"/>
+          </a:p>
+          <a:p>
+            <a:pPr marL="201168" lvl="1" indent="0" algn="just">
+              <a:lnSpc>
+                <a:spcPct val="170000"/>
+              </a:lnSpc>
+              <a:buClrTx/>
+              <a:buNone/>
+            </a:pPr>
+            <a:endParaRPr lang="en-US" sz="1600" dirty="0"/>
+          </a:p>
+          <a:p>
+            <a:pPr lvl="1" algn="just">
+              <a:lnSpc>
+                <a:spcPct val="170000"/>
+              </a:lnSpc>
+              <a:buClrTx/>
+              <a:buFont typeface="Wingdings" panose="05000000000000000000" pitchFamily="2" charset="2"/>
+              <a:buChar char="Ø"/>
+            </a:pPr>
+            <a:endParaRPr lang="en-US" sz="1600" dirty="0"/>
+          </a:p>
+          <a:p>
+            <a:pPr lvl="1" algn="just">
+              <a:lnSpc>
+                <a:spcPct val="170000"/>
+              </a:lnSpc>
+              <a:buClrTx/>
+              <a:buFont typeface="Wingdings" panose="05000000000000000000" pitchFamily="2" charset="2"/>
+              <a:buChar char="Ø"/>
+            </a:pPr>
             <a:endParaRPr lang="en-US" sz="1600" dirty="0"/>
           </a:p>
         </p:txBody>

</xml_diff>